<commit_message>
Renamed lecture and labs for 02
</commit_message>
<xml_diff>
--- a/server/presentations/Lab-02_Lab_SDK_Intro.pptx
+++ b/server/presentations/Lab-02_Lab_SDK_Intro.pptx
@@ -208,7 +208,7 @@
           <a:p>
             <a:fld id="{B5389E1E-C654-E943-9883-792E99AD7287}" type="datetimeFigureOut">
               <a:rPr lang="en-US" smtClean="0"/>
-              <a:t>01/06/15</a:t>
+              <a:t>6/1/15</a:t>
             </a:fld>
             <a:endParaRPr lang="en-US"/>
           </a:p>
@@ -274,7 +274,7 @@
           <a:p>
             <a:fld id="{0550E822-5F4D-874B-B26E-81691243670C}" type="slidenum">
               <a:rPr lang="en-US" smtClean="0"/>
-              <a:t>‹Nr.›</a:t>
+              <a:t>‹#›</a:t>
             </a:fld>
             <a:endParaRPr lang="en-US"/>
           </a:p>
@@ -374,7 +374,7 @@
           <a:p>
             <a:fld id="{9920D99B-2862-464A-984E-65BFC5FC0BBC}" type="datetimeFigureOut">
               <a:rPr lang="en-US" smtClean="0"/>
-              <a:t>01/06/15</a:t>
+              <a:t>6/1/15</a:t>
             </a:fld>
             <a:endParaRPr lang="en-US"/>
           </a:p>
@@ -533,7 +533,7 @@
           <a:p>
             <a:fld id="{F39351FC-18D6-4741-8EEB-9FDB1F020AAC}" type="slidenum">
               <a:rPr lang="en-US" smtClean="0"/>
-              <a:t>‹Nr.›</a:t>
+              <a:t>‹#›</a:t>
             </a:fld>
             <a:endParaRPr lang="en-US"/>
           </a:p>
@@ -1327,7 +1327,7 @@
           <a:p>
             <a:fld id="{C25E7766-B4D4-B545-BC12-CA0EFEB1F16F}" type="slidenum">
               <a:rPr lang="en-US" smtClean="0"/>
-              <a:t>‹Nr.›</a:t>
+              <a:t>‹#›</a:t>
             </a:fld>
             <a:endParaRPr lang="en-US" dirty="0"/>
           </a:p>
@@ -1810,7 +1810,7 @@
           <a:p>
             <a:fld id="{C25E7766-B4D4-B545-BC12-CA0EFEB1F16F}" type="slidenum">
               <a:rPr lang="en-US" smtClean="0"/>
-              <a:t>‹Nr.›</a:t>
+              <a:t>‹#›</a:t>
             </a:fld>
             <a:endParaRPr lang="en-US" dirty="0"/>
           </a:p>
@@ -2166,7 +2166,7 @@
           <a:p>
             <a:fld id="{C25E7766-B4D4-B545-BC12-CA0EFEB1F16F}" type="slidenum">
               <a:rPr lang="en-US" smtClean="0"/>
-              <a:t>‹Nr.›</a:t>
+              <a:t>‹#›</a:t>
             </a:fld>
             <a:endParaRPr lang="en-US" dirty="0"/>
           </a:p>
@@ -2863,7 +2863,7 @@
           <a:p>
             <a:fld id="{C25E7766-B4D4-B545-BC12-CA0EFEB1F16F}" type="slidenum">
               <a:rPr lang="en-US" smtClean="0"/>
-              <a:t>‹Nr.›</a:t>
+              <a:t>‹#›</a:t>
             </a:fld>
             <a:endParaRPr lang="en-US" dirty="0"/>
           </a:p>
@@ -3075,7 +3075,7 @@
             <a:fld id="{E728A94C-44F1-DF43-8BD8-694E750DEF33}" type="slidenum">
               <a:rPr lang="en-US" smtClean="0"/>
               <a:pPr/>
-              <a:t>‹Nr.›</a:t>
+              <a:t>‹#›</a:t>
             </a:fld>
             <a:endParaRPr lang="en-US"/>
           </a:p>
@@ -4161,7 +4161,21 @@
                 <a:latin typeface="Courier New"/>
                 <a:cs typeface="Courier New"/>
               </a:rPr>
-              <a:t>4_sdk_intro/initial </a:t>
+              <a:t>lab-02</a:t>
+            </a:r>
+            <a:r>
+              <a:rPr lang="en-US" dirty="0" smtClean="0">
+                <a:latin typeface="Courier New"/>
+                <a:cs typeface="Courier New"/>
+              </a:rPr>
+              <a:t>_sdk_intro</a:t>
+            </a:r>
+            <a:r>
+              <a:rPr lang="en-US" dirty="0" smtClean="0">
+                <a:latin typeface="Courier New"/>
+                <a:cs typeface="Courier New"/>
+              </a:rPr>
+              <a:t>/initial </a:t>
             </a:r>
             <a:r>
               <a:rPr lang="en-US" dirty="0" smtClean="0"/>
@@ -4173,8 +4187,17 @@
             </a:r>
             <a:r>
               <a:rPr lang="en-US" dirty="0" smtClean="0"/>
-              <a:t> directory if you are lazy)</a:t>
-            </a:r>
+              <a:t> directory </a:t>
+            </a:r>
+            <a:r>
+              <a:rPr lang="en-US" dirty="0" smtClean="0"/>
+              <a:t>if you simply want to review</a:t>
+            </a:r>
+            <a:r>
+              <a:rPr lang="en-US" dirty="0" smtClean="0"/>
+              <a:t>)</a:t>
+            </a:r>
+            <a:endParaRPr lang="en-US" dirty="0" smtClean="0"/>
           </a:p>
           <a:p>
             <a:endParaRPr lang="en-US" dirty="0"/>

</xml_diff>